<commit_message>
fixed ppt error with data overflow
</commit_message>
<xml_diff>
--- a/client/src/components/layout/Moneta.pptx
+++ b/client/src/components/layout/Moneta.pptx
@@ -6374,54 +6374,6 @@
                 <a:spcPts val="1600"/>
               </a:spcBef>
               <a:spcAft>
-                <a:spcPts val="0"/>
-              </a:spcAft>
-              <a:buClr>
-                <a:schemeClr val="dk1"/>
-              </a:buClr>
-              <a:buSzPts val="1100"/>
-              <a:buFont typeface="Arial"/>
-              <a:buNone/>
-            </a:pPr>
-            <a:r>
-              <a:rPr lang="en"/>
-              <a:t>Solution: </a:t>
-            </a:r>
-            <a:endParaRPr/>
-          </a:p>
-          <a:p>
-            <a:pPr indent="0" lvl="0" marL="0" rtl="0" algn="l">
-              <a:lnSpc>
-                <a:spcPct val="100000"/>
-              </a:lnSpc>
-              <a:spcBef>
-                <a:spcPts val="1600"/>
-              </a:spcBef>
-              <a:spcAft>
-                <a:spcPts val="0"/>
-              </a:spcAft>
-              <a:buClr>
-                <a:schemeClr val="dk1"/>
-              </a:buClr>
-              <a:buSzPts val="1100"/>
-              <a:buFont typeface="Arial"/>
-              <a:buNone/>
-            </a:pPr>
-            <a:r>
-              <a:rPr lang="en"/>
-              <a:t>Technologies: </a:t>
-            </a:r>
-            <a:endParaRPr/>
-          </a:p>
-          <a:p>
-            <a:pPr indent="0" lvl="0" marL="0" rtl="0" algn="l">
-              <a:lnSpc>
-                <a:spcPct val="100000"/>
-              </a:lnSpc>
-              <a:spcBef>
-                <a:spcPts val="1600"/>
-              </a:spcBef>
-              <a:spcAft>
                 <a:spcPts val="1600"/>
               </a:spcAft>
               <a:buNone/>

</xml_diff>